<commit_message>
Added changes to PCa slide
</commit_message>
<xml_diff>
--- a/python_project/03 presentation/Pokemony iSA Python.pptx
+++ b/python_project/03 presentation/Pokemony iSA Python.pptx
@@ -953,7 +953,7 @@
         </p:nvSpPr>
         <p:spPr>
           <a:xfrm>
-            <a:off x="381000" y="685800"/>
+            <a:off x="381300" y="685800"/>
             <a:ext cx="6096000" cy="3429000"/>
           </a:xfrm>
           <a:custGeom>
@@ -1137,7 +1137,7 @@
   <p:cSld>
     <p:spTree>
       <p:nvGrpSpPr>
-        <p:cNvPr id="1" name="Shape 80"/>
+        <p:cNvPr id="1" name="Shape 81"/>
         <p:cNvGrpSpPr/>
         <p:nvPr/>
       </p:nvGrpSpPr>
@@ -1151,7 +1151,7 @@
       </p:grpSpPr>
       <p:sp>
         <p:nvSpPr>
-          <p:cNvPr id="81" name="Google Shape;81;g6dc5cc811b_0_15:notes"/>
+          <p:cNvPr id="82" name="Google Shape;82;g6dc5cc811b_0_15:notes"/>
           <p:cNvSpPr>
             <a:spLocks noGrp="1" noRot="1" noChangeAspect="1"/>
           </p:cNvSpPr>
@@ -1161,7 +1161,7 @@
         </p:nvSpPr>
         <p:spPr>
           <a:xfrm>
-            <a:off x="381000" y="685800"/>
+            <a:off x="381300" y="685800"/>
             <a:ext cx="6096000" cy="3429000"/>
           </a:xfrm>
           <a:custGeom>
@@ -1192,7 +1192,7 @@
       </p:sp>
       <p:sp>
         <p:nvSpPr>
-          <p:cNvPr id="82" name="Google Shape;82;g6dc5cc811b_0_15:notes"/>
+          <p:cNvPr id="83" name="Google Shape;83;g6dc5cc811b_0_15:notes"/>
           <p:cNvSpPr txBox="1">
             <a:spLocks noGrp="1"/>
           </p:cNvSpPr>
@@ -5506,7 +5506,7 @@
         <p:fade thruBlk="1"/>
       </p:transition>
     </mc:Choice>
-    <mc:Fallback xmlns="" xmlns:mv="urn:schemas-microsoft-com:mac:vml" xmlns:c="http://schemas.openxmlformats.org/drawingml/2006/chart" xmlns:dgm="http://schemas.openxmlformats.org/drawingml/2006/diagram" xmlns:o="urn:schemas-microsoft-com:office:office" xmlns:v="urn:schemas-microsoft-com:vml" xmlns:pvml="urn:schemas-microsoft-com:office:powerpoint" xmlns:com="http://schemas.openxmlformats.org/drawingml/2006/compatibility" xmlns:p15="http://schemas.microsoft.com/office/powerpoint/2012/main">
+    <mc:Fallback xmlns:p15="http://schemas.microsoft.com/office/powerpoint/2012/main" xmlns:com="http://schemas.openxmlformats.org/drawingml/2006/compatibility" xmlns:pvml="urn:schemas-microsoft-com:office:powerpoint" xmlns:v="urn:schemas-microsoft-com:vml" xmlns:o="urn:schemas-microsoft-com:office:office" xmlns:dgm="http://schemas.openxmlformats.org/drawingml/2006/diagram" xmlns:c="http://schemas.openxmlformats.org/drawingml/2006/chart" xmlns:mv="urn:schemas-microsoft-com:mac:vml" xmlns="">
       <p:transition spd="slow">
         <p:fade/>
       </p:transition>
@@ -6726,7 +6726,7 @@
               </a:spcAft>
               <a:buNone/>
             </a:pPr>
-            <a:endParaRPr dirty="0"/>
+            <a:endParaRPr/>
           </a:p>
           <a:p>
             <a:pPr marL="457200" lvl="0" indent="-342900" algn="l" rtl="0">
@@ -6743,18 +6743,18 @@
               <a:buChar char="●"/>
             </a:pPr>
             <a:r>
-              <a:rPr lang="pl" dirty="0"/>
+              <a:rPr lang="pl"/>
               <a:t>LICZBA TYPÓW POKEMONÓW: </a:t>
             </a:r>
             <a:r>
-              <a:rPr lang="pl" b="1" dirty="0">
+              <a:rPr lang="pl" b="1">
                 <a:solidFill>
                   <a:srgbClr val="A61C00"/>
                 </a:solidFill>
               </a:rPr>
               <a:t>18</a:t>
             </a:r>
-            <a:endParaRPr b="1" dirty="0">
+            <a:endParaRPr b="1">
               <a:solidFill>
                 <a:srgbClr val="A61C00"/>
               </a:solidFill>
@@ -6775,18 +6775,18 @@
               <a:buChar char="●"/>
             </a:pPr>
             <a:r>
-              <a:rPr lang="pl" dirty="0"/>
+              <a:rPr lang="pl"/>
               <a:t>LICZBA GATUNKÓW: </a:t>
             </a:r>
             <a:r>
-              <a:rPr lang="pl" b="1" dirty="0">
+              <a:rPr lang="pl" b="1">
                 <a:solidFill>
                   <a:srgbClr val="A61C00"/>
                 </a:solidFill>
               </a:rPr>
               <a:t>656</a:t>
             </a:r>
-            <a:endParaRPr b="1" dirty="0">
+            <a:endParaRPr b="1">
               <a:solidFill>
                 <a:srgbClr val="A61C00"/>
               </a:solidFill>
@@ -6807,18 +6807,18 @@
               <a:buChar char="●"/>
             </a:pPr>
             <a:r>
-              <a:rPr lang="pl" dirty="0"/>
+              <a:rPr lang="pl"/>
               <a:t>LICZEBNOŚĆ DRUŻYNY: </a:t>
             </a:r>
             <a:r>
-              <a:rPr lang="pl" b="1" dirty="0">
+              <a:rPr lang="pl" b="1">
                 <a:solidFill>
                   <a:srgbClr val="A61C00"/>
                 </a:solidFill>
               </a:rPr>
               <a:t>6</a:t>
             </a:r>
-            <a:endParaRPr b="1" dirty="0">
+            <a:endParaRPr b="1">
               <a:solidFill>
                 <a:srgbClr val="A61C00"/>
               </a:solidFill>
@@ -6839,14 +6839,10 @@
               <a:buChar char="●"/>
             </a:pPr>
             <a:r>
-              <a:rPr lang="pl-PL" dirty="0"/>
-              <a:t>LICZBA</a:t>
+              <a:rPr lang="pl"/>
+              <a:t>LICZBA KOMBINACJI WYBORU DRUŻYNY:</a:t>
             </a:r>
-            <a:r>
-              <a:rPr lang="pl" dirty="0"/>
-              <a:t> KOMBINACJI WYBORU DRUŻYNY:</a:t>
-            </a:r>
-            <a:endParaRPr dirty="0"/>
+            <a:endParaRPr/>
           </a:p>
           <a:p>
             <a:pPr marL="457200" lvl="0" indent="0" algn="l" rtl="0">
@@ -6858,7 +6854,7 @@
               </a:spcAft>
               <a:buNone/>
             </a:pPr>
-            <a:endParaRPr dirty="0"/>
+            <a:endParaRPr/>
           </a:p>
           <a:p>
             <a:pPr marL="0" lvl="0" indent="0" algn="l" rtl="0">
@@ -6870,7 +6866,7 @@
               </a:spcAft>
               <a:buNone/>
             </a:pPr>
-            <a:endParaRPr dirty="0"/>
+            <a:endParaRPr/>
           </a:p>
           <a:p>
             <a:pPr marL="0" lvl="0" indent="0" algn="l" rtl="0">
@@ -6882,7 +6878,7 @@
               </a:spcAft>
               <a:buNone/>
             </a:pPr>
-            <a:endParaRPr dirty="0"/>
+            <a:endParaRPr/>
           </a:p>
           <a:p>
             <a:pPr marL="0" lvl="0" indent="0" algn="l" rtl="0">
@@ -6894,7 +6890,7 @@
               </a:spcAft>
               <a:buNone/>
             </a:pPr>
-            <a:endParaRPr dirty="0"/>
+            <a:endParaRPr/>
           </a:p>
         </p:txBody>
       </p:sp>
@@ -7064,64 +7060,6 @@
       </p:grpSpPr>
       <p:sp>
         <p:nvSpPr>
-          <p:cNvPr id="74" name="Google Shape;74;p16"/>
-          <p:cNvSpPr txBox="1">
-            <a:spLocks noGrp="1"/>
-          </p:cNvSpPr>
-          <p:nvPr>
-            <p:ph type="title"/>
-          </p:nvPr>
-        </p:nvSpPr>
-        <p:spPr>
-          <a:xfrm>
-            <a:off x="311700" y="445025"/>
-            <a:ext cx="8520600" cy="572700"/>
-          </a:xfrm>
-          <a:prstGeom prst="rect">
-            <a:avLst/>
-          </a:prstGeom>
-        </p:spPr>
-        <p:txBody>
-          <a:bodyPr spcFirstLastPara="1" wrap="square" lIns="91425" tIns="91425" rIns="91425" bIns="91425" anchor="t" anchorCtr="0">
-            <a:noAutofit/>
-          </a:bodyPr>
-          <a:lstStyle/>
-          <a:p>
-            <a:pPr marL="0" lvl="0" indent="0" algn="l" rtl="0">
-              <a:spcBef>
-                <a:spcPts val="0"/>
-              </a:spcBef>
-              <a:spcAft>
-                <a:spcPts val="0"/>
-              </a:spcAft>
-              <a:buNone/>
-            </a:pPr>
-            <a:r>
-              <a:rPr lang="pl" sz="3000">
-                <a:solidFill>
-                  <a:srgbClr val="A61C00"/>
-                </a:solidFill>
-                <a:latin typeface="Roboto"/>
-                <a:ea typeface="Roboto"/>
-                <a:cs typeface="Roboto"/>
-                <a:sym typeface="Roboto"/>
-              </a:rPr>
-              <a:t>PCA - ANALIZA WSPÓŁCZYNNIKÓW</a:t>
-            </a:r>
-            <a:endParaRPr sz="3000">
-              <a:solidFill>
-                <a:srgbClr val="A61C00"/>
-              </a:solidFill>
-              <a:latin typeface="Roboto"/>
-              <a:ea typeface="Roboto"/>
-              <a:cs typeface="Roboto"/>
-              <a:sym typeface="Roboto"/>
-            </a:endParaRPr>
-          </a:p>
-        </p:txBody>
-      </p:sp>
-      <p:sp>
-        <p:nvSpPr>
           <p:cNvPr id="75" name="Google Shape;75;p16"/>
           <p:cNvSpPr txBox="1">
             <a:spLocks noGrp="1"/>
@@ -7159,10 +7097,10 @@
               <a:buAutoNum type="arabicPeriod"/>
             </a:pPr>
             <a:r>
-              <a:rPr lang="pl" sz="1400"/>
+              <a:rPr lang="pl" sz="1400" dirty="0"/>
               <a:t>SKALOWANIE I NORMALIZACJA CECH: </a:t>
             </a:r>
-            <a:endParaRPr sz="1400"/>
+            <a:endParaRPr sz="1400" dirty="0"/>
           </a:p>
           <a:p>
             <a:pPr marL="457200" lvl="0" indent="-317500" algn="l" rtl="0">
@@ -7179,10 +7117,10 @@
               <a:buAutoNum type="arabicPeriod"/>
             </a:pPr>
             <a:r>
-              <a:rPr lang="pl" sz="1400"/>
+              <a:rPr lang="pl" sz="1400" dirty="0"/>
               <a:t>ZASTOSOWANIE PCA:</a:t>
             </a:r>
-            <a:endParaRPr sz="1400"/>
+            <a:endParaRPr sz="1400" dirty="0"/>
           </a:p>
           <a:p>
             <a:pPr marL="457200" lvl="0" indent="-317500" algn="l" rtl="0">
@@ -7199,10 +7137,10 @@
               <a:buAutoNum type="arabicPeriod"/>
             </a:pPr>
             <a:r>
-              <a:rPr lang="pl" sz="1400"/>
+              <a:rPr lang="pl" sz="1400" dirty="0"/>
               <a:t>INTERPRETACJA WYNIKÓW:</a:t>
             </a:r>
-            <a:endParaRPr sz="1400"/>
+            <a:endParaRPr sz="1400" dirty="0"/>
           </a:p>
           <a:p>
             <a:pPr marL="457200" lvl="0" indent="0" algn="l" rtl="0">
@@ -7217,7 +7155,7 @@
               </a:spcAft>
               <a:buNone/>
             </a:pPr>
-            <a:endParaRPr/>
+            <a:endParaRPr dirty="0"/>
           </a:p>
           <a:p>
             <a:pPr marL="0" lvl="0" indent="0" algn="l" rtl="0">
@@ -7229,7 +7167,65 @@
               </a:spcAft>
               <a:buNone/>
             </a:pPr>
-            <a:endParaRPr/>
+            <a:endParaRPr dirty="0"/>
+          </a:p>
+        </p:txBody>
+      </p:sp>
+      <p:sp>
+        <p:nvSpPr>
+          <p:cNvPr id="74" name="Google Shape;74;p16"/>
+          <p:cNvSpPr txBox="1">
+            <a:spLocks noGrp="1"/>
+          </p:cNvSpPr>
+          <p:nvPr>
+            <p:ph type="title"/>
+          </p:nvPr>
+        </p:nvSpPr>
+        <p:spPr>
+          <a:xfrm>
+            <a:off x="311700" y="445025"/>
+            <a:ext cx="8520600" cy="572700"/>
+          </a:xfrm>
+          <a:prstGeom prst="rect">
+            <a:avLst/>
+          </a:prstGeom>
+        </p:spPr>
+        <p:txBody>
+          <a:bodyPr spcFirstLastPara="1" wrap="square" lIns="91425" tIns="91425" rIns="91425" bIns="91425" anchor="t" anchorCtr="0">
+            <a:noAutofit/>
+          </a:bodyPr>
+          <a:lstStyle/>
+          <a:p>
+            <a:pPr marL="0" lvl="0" indent="0" algn="l" rtl="0">
+              <a:spcBef>
+                <a:spcPts val="0"/>
+              </a:spcBef>
+              <a:spcAft>
+                <a:spcPts val="0"/>
+              </a:spcAft>
+              <a:buNone/>
+            </a:pPr>
+            <a:r>
+              <a:rPr lang="pl" sz="3000">
+                <a:solidFill>
+                  <a:srgbClr val="A61C00"/>
+                </a:solidFill>
+                <a:latin typeface="Roboto"/>
+                <a:ea typeface="Roboto"/>
+                <a:cs typeface="Roboto"/>
+                <a:sym typeface="Roboto"/>
+              </a:rPr>
+              <a:t>PCA - ANALIZA WSPÓŁCZYNNIKÓW</a:t>
+            </a:r>
+            <a:endParaRPr sz="3000">
+              <a:solidFill>
+                <a:srgbClr val="A61C00"/>
+              </a:solidFill>
+              <a:latin typeface="Roboto"/>
+              <a:ea typeface="Roboto"/>
+              <a:cs typeface="Roboto"/>
+              <a:sym typeface="Roboto"/>
+            </a:endParaRPr>
           </a:p>
         </p:txBody>
       </p:sp>
@@ -7277,7 +7273,7 @@
         </p:blipFill>
         <p:spPr>
           <a:xfrm>
-            <a:off x="4357300" y="1488377"/>
+            <a:off x="4328726" y="1487720"/>
             <a:ext cx="1852799" cy="269825"/>
           </a:xfrm>
           <a:prstGeom prst="rect">
@@ -7305,7 +7301,7 @@
         </p:blipFill>
         <p:spPr>
           <a:xfrm>
-            <a:off x="2947587" y="1936854"/>
+            <a:off x="2947588" y="1936854"/>
             <a:ext cx="4209270" cy="269825"/>
           </a:xfrm>
           <a:prstGeom prst="rect">
@@ -7345,11 +7341,122 @@
           </a:ln>
         </p:spPr>
       </p:pic>
+      <p:pic>
+        <p:nvPicPr>
+          <p:cNvPr id="80" name="Google Shape;80;p16"/>
+          <p:cNvPicPr preferRelativeResize="0"/>
+          <p:nvPr/>
+        </p:nvPicPr>
+        <p:blipFill>
+          <a:blip r:embed="rId8">
+            <a:alphaModFix/>
+          </a:blip>
+          <a:stretch>
+            <a:fillRect/>
+          </a:stretch>
+        </p:blipFill>
+        <p:spPr>
+          <a:xfrm>
+            <a:off x="481775" y="1288200"/>
+            <a:ext cx="6976300" cy="3459450"/>
+          </a:xfrm>
+          <a:prstGeom prst="rect">
+            <a:avLst/>
+          </a:prstGeom>
+          <a:noFill/>
+          <a:ln>
+            <a:noFill/>
+          </a:ln>
+        </p:spPr>
+      </p:pic>
     </p:spTree>
   </p:cSld>
   <p:clrMapOvr>
     <a:masterClrMapping/>
   </p:clrMapOvr>
+  <p:timing>
+    <p:tnLst>
+      <p:par>
+        <p:cTn id="1" dur="indefinite" restart="never" nodeType="tmRoot">
+          <p:childTnLst>
+            <p:seq concurrent="1" nextAc="seek">
+              <p:cTn id="2" dur="indefinite" nodeType="mainSeq">
+                <p:childTnLst>
+                  <p:par>
+                    <p:cTn id="3" fill="hold">
+                      <p:stCondLst>
+                        <p:cond delay="indefinite"/>
+                      </p:stCondLst>
+                      <p:childTnLst>
+                        <p:par>
+                          <p:cTn id="4" fill="hold">
+                            <p:stCondLst>
+                              <p:cond delay="0"/>
+                            </p:stCondLst>
+                            <p:childTnLst>
+                              <p:par>
+                                <p:cTn id="5" presetID="10" presetClass="exit" presetSubtype="0" fill="hold" nodeType="clickEffect">
+                                  <p:stCondLst>
+                                    <p:cond delay="0"/>
+                                  </p:stCondLst>
+                                  <p:childTnLst>
+                                    <p:animEffect transition="out" filter="fade">
+                                      <p:cBhvr>
+                                        <p:cTn id="6" dur="2500"/>
+                                        <p:tgtEl>
+                                          <p:spTgt spid="80"/>
+                                        </p:tgtEl>
+                                      </p:cBhvr>
+                                    </p:animEffect>
+                                    <p:set>
+                                      <p:cBhvr>
+                                        <p:cTn id="7" dur="1" fill="hold">
+                                          <p:stCondLst>
+                                            <p:cond delay="2500"/>
+                                          </p:stCondLst>
+                                        </p:cTn>
+                                        <p:tgtEl>
+                                          <p:spTgt spid="80"/>
+                                        </p:tgtEl>
+                                        <p:attrNameLst>
+                                          <p:attrName>style.visibility</p:attrName>
+                                        </p:attrNameLst>
+                                      </p:cBhvr>
+                                      <p:to>
+                                        <p:strVal val="hidden"/>
+                                      </p:to>
+                                    </p:set>
+                                  </p:childTnLst>
+                                </p:cTn>
+                              </p:par>
+                            </p:childTnLst>
+                          </p:cTn>
+                        </p:par>
+                      </p:childTnLst>
+                    </p:cTn>
+                  </p:par>
+                </p:childTnLst>
+              </p:cTn>
+              <p:prevCondLst>
+                <p:cond evt="onPrev" delay="0">
+                  <p:tgtEl>
+                    <p:sldTgt/>
+                  </p:tgtEl>
+                </p:cond>
+              </p:prevCondLst>
+              <p:nextCondLst>
+                <p:cond evt="onNext" delay="0">
+                  <p:tgtEl>
+                    <p:sldTgt/>
+                  </p:tgtEl>
+                </p:cond>
+              </p:nextCondLst>
+            </p:seq>
+          </p:childTnLst>
+        </p:cTn>
+      </p:par>
+    </p:tnLst>
+  </p:timing>
 </p:sld>
 </file>
 
@@ -7371,7 +7478,7 @@
     </p:bg>
     <p:spTree>
       <p:nvGrpSpPr>
-        <p:cNvPr id="1" name="Shape 83"/>
+        <p:cNvPr id="1" name="Shape 84"/>
         <p:cNvGrpSpPr/>
         <p:nvPr/>
       </p:nvGrpSpPr>
@@ -7385,7 +7492,7 @@
       </p:grpSpPr>
       <p:sp>
         <p:nvSpPr>
-          <p:cNvPr id="84" name="Google Shape;84;p17"/>
+          <p:cNvPr id="85" name="Google Shape;85;p17"/>
           <p:cNvSpPr txBox="1">
             <a:spLocks noGrp="1"/>
           </p:cNvSpPr>
@@ -7710,7 +7817,7 @@
         <p:fade thruBlk="1"/>
       </p:transition>
     </mc:Choice>
-    <mc:Fallback xmlns="" xmlns:mv="urn:schemas-microsoft-com:mac:vml" xmlns:c="http://schemas.openxmlformats.org/drawingml/2006/chart" xmlns:dgm="http://schemas.openxmlformats.org/drawingml/2006/diagram" xmlns:o="urn:schemas-microsoft-com:office:office" xmlns:v="urn:schemas-microsoft-com:vml" xmlns:pvml="urn:schemas-microsoft-com:office:powerpoint" xmlns:com="http://schemas.openxmlformats.org/drawingml/2006/compatibility" xmlns:p15="http://schemas.microsoft.com/office/powerpoint/2012/main">
+    <mc:Fallback xmlns:p15="http://schemas.microsoft.com/office/powerpoint/2012/main" xmlns:com="http://schemas.openxmlformats.org/drawingml/2006/compatibility" xmlns:pvml="urn:schemas-microsoft-com:office:powerpoint" xmlns:v="urn:schemas-microsoft-com:vml" xmlns:o="urn:schemas-microsoft-com:office:office" xmlns:dgm="http://schemas.openxmlformats.org/drawingml/2006/diagram" xmlns:c="http://schemas.openxmlformats.org/drawingml/2006/chart" xmlns:mv="urn:schemas-microsoft-com:mac:vml" xmlns="">
       <p:transition spd="slow">
         <p:fade/>
       </p:transition>

</xml_diff>